<commit_message>
style: changed to english
</commit_message>
<xml_diff>
--- a/PresentationETL.pptx
+++ b/PresentationETL.pptx
@@ -2623,12 +2623,68 @@
           <a:p>
             <a:pPr algn="ctr"/>
             <a:r>
+              <a:rPr lang="es-MX" sz="2800" b="1" dirty="0" err="1">
+                <a:solidFill>
+                  <a:schemeClr val="bg1"/>
+                </a:solidFill>
+              </a:rPr>
+              <a:t>Mechatronics</a:t>
+            </a:r>
+            <a:r>
               <a:rPr lang="es-MX" sz="2800" b="1" dirty="0">
                 <a:solidFill>
                   <a:schemeClr val="bg1"/>
                 </a:solidFill>
               </a:rPr>
-              <a:t>Ingeniero Mecatrónico Especialista en Inteligencia Artificial, </a:t>
+              <a:t> </a:t>
+            </a:r>
+            <a:r>
+              <a:rPr lang="es-MX" sz="2800" b="1" dirty="0" err="1">
+                <a:solidFill>
+                  <a:schemeClr val="bg1"/>
+                </a:solidFill>
+              </a:rPr>
+              <a:t>Engineer</a:t>
+            </a:r>
+            <a:r>
+              <a:rPr lang="es-MX" sz="2800" b="1" dirty="0">
+                <a:solidFill>
+                  <a:schemeClr val="bg1"/>
+                </a:solidFill>
+              </a:rPr>
+              <a:t> </a:t>
+            </a:r>
+            <a:r>
+              <a:rPr lang="es-MX" sz="2800" b="1" dirty="0" err="1">
+                <a:solidFill>
+                  <a:schemeClr val="bg1"/>
+                </a:solidFill>
+              </a:rPr>
+              <a:t>Specialist</a:t>
+            </a:r>
+            <a:r>
+              <a:rPr lang="es-MX" sz="2800" b="1" dirty="0">
+                <a:solidFill>
+                  <a:schemeClr val="bg1"/>
+                </a:solidFill>
+              </a:rPr>
+              <a:t> in Artificial </a:t>
+            </a:r>
+            <a:r>
+              <a:rPr lang="es-MX" sz="2800" b="1" dirty="0" err="1">
+                <a:solidFill>
+                  <a:schemeClr val="bg1"/>
+                </a:solidFill>
+              </a:rPr>
+              <a:t>Intelligence</a:t>
+            </a:r>
+            <a:r>
+              <a:rPr lang="es-MX" sz="2800" b="1" dirty="0">
+                <a:solidFill>
+                  <a:schemeClr val="bg1"/>
+                </a:solidFill>
+              </a:rPr>
+              <a:t>,</a:t>
             </a:r>
           </a:p>
           <a:p>

</xml_diff>